<commit_message>
[Documents] modifing fabor filter algorithm explanation
</commit_message>
<xml_diff>
--- a/projeto RN.pptx
+++ b/projeto RN.pptx
@@ -228,7 +228,7 @@
           <a:p>
             <a:fld id="{9F5B8AE1-A868-454D-9019-D713EF62A972}" type="datetimeFigureOut">
               <a:rPr lang="en-US" smtClean="0"/>
-              <a:t>18/07/12</a:t>
+              <a:t>7/18/12</a:t>
             </a:fld>
             <a:endParaRPr lang="en-US"/>
           </a:p>
@@ -715,7 +715,7 @@
           <a:p>
             <a:fld id="{70FAA508-F0CD-46EA-95FB-26B559A0B5D9}" type="datetimeFigureOut">
               <a:rPr lang="en-US" smtClean="0"/>
-              <a:t>18/07/12</a:t>
+              <a:t>7/18/12</a:t>
             </a:fld>
             <a:endParaRPr lang="en-US"/>
           </a:p>
@@ -1036,7 +1036,7 @@
           <a:p>
             <a:fld id="{70FAA508-F0CD-46EA-95FB-26B559A0B5D9}" type="datetimeFigureOut">
               <a:rPr lang="en-US" smtClean="0"/>
-              <a:t>18/07/12</a:t>
+              <a:t>7/18/12</a:t>
             </a:fld>
             <a:endParaRPr lang="en-US"/>
           </a:p>
@@ -1313,7 +1313,7 @@
           <a:p>
             <a:fld id="{70FAA508-F0CD-46EA-95FB-26B559A0B5D9}" type="datetimeFigureOut">
               <a:rPr lang="en-US" smtClean="0"/>
-              <a:t>18/07/12</a:t>
+              <a:t>7/18/12</a:t>
             </a:fld>
             <a:endParaRPr lang="en-US"/>
           </a:p>
@@ -1607,7 +1607,7 @@
           <a:p>
             <a:fld id="{70FAA508-F0CD-46EA-95FB-26B559A0B5D9}" type="datetimeFigureOut">
               <a:rPr lang="en-US" smtClean="0"/>
-              <a:t>18/07/12</a:t>
+              <a:t>7/18/12</a:t>
             </a:fld>
             <a:endParaRPr lang="en-US"/>
           </a:p>
@@ -1936,7 +1936,7 @@
           <a:p>
             <a:fld id="{70FAA508-F0CD-46EA-95FB-26B559A0B5D9}" type="datetimeFigureOut">
               <a:rPr lang="en-US" smtClean="0"/>
-              <a:t>18/07/12</a:t>
+              <a:t>7/18/12</a:t>
             </a:fld>
             <a:endParaRPr lang="en-US"/>
           </a:p>
@@ -2187,7 +2187,7 @@
           <a:p>
             <a:fld id="{70FAA508-F0CD-46EA-95FB-26B559A0B5D9}" type="datetimeFigureOut">
               <a:rPr lang="en-US" smtClean="0"/>
-              <a:t>18/07/12</a:t>
+              <a:t>7/18/12</a:t>
             </a:fld>
             <a:endParaRPr lang="en-US"/>
           </a:p>
@@ -2366,7 +2366,7 @@
           <a:p>
             <a:fld id="{70FAA508-F0CD-46EA-95FB-26B559A0B5D9}" type="datetimeFigureOut">
               <a:rPr lang="en-US" smtClean="0"/>
-              <a:t>18/07/12</a:t>
+              <a:t>7/18/12</a:t>
             </a:fld>
             <a:endParaRPr lang="en-US"/>
           </a:p>
@@ -2535,7 +2535,7 @@
           <a:p>
             <a:fld id="{70FAA508-F0CD-46EA-95FB-26B559A0B5D9}" type="datetimeFigureOut">
               <a:rPr lang="en-US" smtClean="0"/>
-              <a:t>18/07/12</a:t>
+              <a:t>7/18/12</a:t>
             </a:fld>
             <a:endParaRPr lang="en-US"/>
           </a:p>
@@ -2804,7 +2804,7 @@
           <a:p>
             <a:fld id="{70FAA508-F0CD-46EA-95FB-26B559A0B5D9}" type="datetimeFigureOut">
               <a:rPr lang="en-US" smtClean="0"/>
-              <a:t>18/07/12</a:t>
+              <a:t>7/18/12</a:t>
             </a:fld>
             <a:endParaRPr lang="en-US"/>
           </a:p>
@@ -3111,7 +3111,7 @@
           <a:p>
             <a:fld id="{70FAA508-F0CD-46EA-95FB-26B559A0B5D9}" type="datetimeFigureOut">
               <a:rPr lang="en-US" smtClean="0"/>
-              <a:t>18/07/12</a:t>
+              <a:t>7/18/12</a:t>
             </a:fld>
             <a:endParaRPr lang="en-US"/>
           </a:p>
@@ -3403,7 +3403,7 @@
           <a:p>
             <a:fld id="{70FAA508-F0CD-46EA-95FB-26B559A0B5D9}" type="datetimeFigureOut">
               <a:rPr lang="en-US" smtClean="0"/>
-              <a:t>18/07/12</a:t>
+              <a:t>7/18/12</a:t>
             </a:fld>
             <a:endParaRPr lang="en-US"/>
           </a:p>
@@ -3833,7 +3833,7 @@
           <a:p>
             <a:fld id="{70FAA508-F0CD-46EA-95FB-26B559A0B5D9}" type="datetimeFigureOut">
               <a:rPr lang="en-US" smtClean="0"/>
-              <a:t>18/07/12</a:t>
+              <a:t>7/18/12</a:t>
             </a:fld>
             <a:endParaRPr lang="en-US"/>
           </a:p>
@@ -4179,7 +4179,7 @@
           <a:p>
             <a:fld id="{70FAA508-F0CD-46EA-95FB-26B559A0B5D9}" type="datetimeFigureOut">
               <a:rPr lang="en-US" smtClean="0"/>
-              <a:t>18/07/12</a:t>
+              <a:t>7/18/12</a:t>
             </a:fld>
             <a:endParaRPr lang="en-US"/>
           </a:p>
@@ -4269,7 +4269,7 @@
           <a:p>
             <a:fld id="{70FAA508-F0CD-46EA-95FB-26B559A0B5D9}" type="datetimeFigureOut">
               <a:rPr lang="en-US" smtClean="0"/>
-              <a:t>18/07/12</a:t>
+              <a:t>7/18/12</a:t>
             </a:fld>
             <a:endParaRPr lang="en-US"/>
           </a:p>
@@ -4606,7 +4606,7 @@
           <a:p>
             <a:fld id="{70FAA508-F0CD-46EA-95FB-26B559A0B5D9}" type="datetimeFigureOut">
               <a:rPr lang="en-US" smtClean="0"/>
-              <a:t>18/07/12</a:t>
+              <a:t>7/18/12</a:t>
             </a:fld>
             <a:endParaRPr lang="en-US"/>
           </a:p>
@@ -4818,7 +4818,7 @@
           <a:p>
             <a:fld id="{70FAA508-F0CD-46EA-95FB-26B559A0B5D9}" type="datetimeFigureOut">
               <a:rPr lang="en-US" smtClean="0"/>
-              <a:t>18/07/12</a:t>
+              <a:t>7/18/12</a:t>
             </a:fld>
             <a:endParaRPr lang="en-US"/>
           </a:p>
@@ -13726,7 +13726,7 @@
         </p:spPr>
         <p:txBody>
           <a:bodyPr>
-            <a:normAutofit lnSpcReduction="10000"/>
+            <a:normAutofit fontScale="92500"/>
           </a:bodyPr>
           <a:lstStyle/>
           <a:p>
@@ -13917,7 +13917,15 @@
             </a:r>
             <a:r>
               <a:rPr lang="en-US" dirty="0" smtClean="0"/>
-              <a:t> das 4 </a:t>
+              <a:t> de 2/3 das </a:t>
+            </a:r>
+            <a:r>
+              <a:rPr lang="en-US" dirty="0" err="1" smtClean="0"/>
+              <a:t>linhas</a:t>
+            </a:r>
+            <a:r>
+              <a:rPr lang="en-US" dirty="0" smtClean="0"/>
+              <a:t> e </a:t>
             </a:r>
             <a:r>
               <a:rPr lang="en-US" dirty="0" err="1" smtClean="0"/>
@@ -13925,19 +13933,11 @@
             </a:r>
             <a:r>
               <a:rPr lang="en-US" dirty="0" smtClean="0"/>
-              <a:t> </a:t>
-            </a:r>
-            <a:r>
-              <a:rPr lang="en-US" dirty="0" err="1" smtClean="0"/>
-              <a:t>menos</a:t>
-            </a:r>
-            <a:r>
-              <a:rPr lang="en-US" dirty="0" smtClean="0"/>
-              <a:t> </a:t>
-            </a:r>
-            <a:r>
-              <a:rPr lang="en-US" dirty="0" err="1" smtClean="0"/>
-              <a:t>significantes</a:t>
+              <a:t> de forma </a:t>
+            </a:r>
+            <a:r>
+              <a:rPr lang="en-US" dirty="0" err="1" smtClean="0"/>
+              <a:t>alternada</a:t>
             </a:r>
             <a:endParaRPr lang="en-US" dirty="0" smtClean="0"/>
           </a:p>
@@ -14503,11 +14503,7 @@
             </a:r>
             <a:r>
               <a:rPr lang="en-US" dirty="0" err="1" smtClean="0"/>
-              <a:t>m</a:t>
-            </a:r>
-            <a:r>
-              <a:rPr lang="en-US" dirty="0" err="1" smtClean="0"/>
-              <a:t>étodo</a:t>
+              <a:t>método</a:t>
             </a:r>
             <a:r>
               <a:rPr lang="en-US" dirty="0" smtClean="0"/>
@@ -14519,23 +14515,11 @@
             </a:r>
             <a:r>
               <a:rPr lang="en-US" dirty="0" err="1" smtClean="0"/>
-              <a:t>d</a:t>
-            </a:r>
-            <a:r>
-              <a:rPr lang="en-US" dirty="0" err="1" smtClean="0"/>
-              <a:t>etec</a:t>
-            </a:r>
-            <a:r>
-              <a:rPr lang="en-US" dirty="0" err="1" smtClean="0"/>
-              <a:t>ção</a:t>
-            </a:r>
-            <a:r>
-              <a:rPr lang="en-US" dirty="0" smtClean="0"/>
-              <a:t> </a:t>
-            </a:r>
-            <a:r>
-              <a:rPr lang="en-US" dirty="0" smtClean="0"/>
-              <a:t>facial </a:t>
+              <a:t>detecção</a:t>
+            </a:r>
+            <a:r>
+              <a:rPr lang="en-US" dirty="0" smtClean="0"/>
+              <a:t> facial </a:t>
             </a:r>
             <a:r>
               <a:rPr lang="en-US" dirty="0" err="1" smtClean="0"/>
@@ -14598,11 +14582,7 @@
             <a:pPr lvl="1"/>
             <a:r>
               <a:rPr lang="en-US" dirty="0" err="1" smtClean="0"/>
-              <a:t>Ilumina</a:t>
-            </a:r>
-            <a:r>
-              <a:rPr lang="en-US" dirty="0" err="1" smtClean="0"/>
-              <a:t>ção</a:t>
+              <a:t>Iluminação</a:t>
             </a:r>
             <a:endParaRPr lang="en-US" dirty="0"/>
           </a:p>

</xml_diff>